<commit_message>
Added technologies to presentation
</commit_message>
<xml_diff>
--- a/docs/presentation_intermediaire.pptx
+++ b/docs/presentation_intermediaire.pptx
@@ -108,6 +108,11 @@
       </a:defRPr>
     </a:lvl9pPr>
   </p:defaultTextStyle>
+  <p:extLst>
+    <p:ext uri="{EFAFB233-063F-42B5-8137-9DF3F51BA10A}">
+      <p15:sldGuideLst xmlns:p15="http://schemas.microsoft.com/office/powerpoint/2012/main"/>
+    </p:ext>
+  </p:extLst>
 </p:presentation>
 </file>
 
@@ -153,7 +158,7 @@
           </a:lstStyle>
           <a:p>
             <a:r>
-              <a:rPr lang="en-US" smtClean="0"/>
+              <a:rPr lang="en-US"/>
               <a:t>Cliquez et modifiez le titre</a:t>
             </a:r>
             <a:endParaRPr lang="en-US" dirty="0"/>
@@ -218,7 +223,7 @@
           </a:lstStyle>
           <a:p>
             <a:r>
-              <a:rPr lang="en-US" smtClean="0"/>
+              <a:rPr lang="en-US"/>
               <a:t>Cliquez pour modifier le style des sous-titres du masque</a:t>
             </a:r>
             <a:endParaRPr lang="en-US" dirty="0"/>
@@ -242,7 +247,7 @@
           <a:p>
             <a:fld id="{ECD19FB2-3AAB-4D03-B13A-2960828C78E3}" type="datetimeFigureOut">
               <a:rPr lang="en-US" smtClean="0"/>
-              <a:t>11/14/16</a:t>
+              <a:t>11/15/2016</a:t>
             </a:fld>
             <a:endParaRPr lang="en-US" dirty="0"/>
           </a:p>
@@ -337,7 +342,7 @@
           <a:lstStyle/>
           <a:p>
             <a:r>
-              <a:rPr lang="en-US" smtClean="0"/>
+              <a:rPr lang="en-US"/>
               <a:t>Cliquez et modifiez le titre</a:t>
             </a:r>
             <a:endParaRPr lang="en-US" dirty="0"/>
@@ -361,35 +366,35 @@
           <a:p>
             <a:pPr lvl="0"/>
             <a:r>
-              <a:rPr lang="en-US" smtClean="0"/>
+              <a:rPr lang="en-US"/>
               <a:t>Cliquez pour modifier les styles du texte du masque</a:t>
             </a:r>
           </a:p>
           <a:p>
             <a:pPr lvl="1"/>
             <a:r>
-              <a:rPr lang="en-US" smtClean="0"/>
+              <a:rPr lang="en-US"/>
               <a:t>Deuxième niveau</a:t>
             </a:r>
           </a:p>
           <a:p>
             <a:pPr lvl="2"/>
             <a:r>
-              <a:rPr lang="en-US" smtClean="0"/>
+              <a:rPr lang="en-US"/>
               <a:t>Troisième niveau</a:t>
             </a:r>
           </a:p>
           <a:p>
             <a:pPr lvl="3"/>
             <a:r>
-              <a:rPr lang="en-US" smtClean="0"/>
+              <a:rPr lang="en-US"/>
               <a:t>Quatrième niveau</a:t>
             </a:r>
           </a:p>
           <a:p>
             <a:pPr lvl="4"/>
             <a:r>
-              <a:rPr lang="en-US" smtClean="0"/>
+              <a:rPr lang="en-US"/>
               <a:t>Cinquième niveau</a:t>
             </a:r>
             <a:endParaRPr lang="en-US" dirty="0"/>
@@ -413,7 +418,7 @@
           <a:p>
             <a:fld id="{0DED02AE-B9A4-47BD-AF8E-97E16144138B}" type="datetimeFigureOut">
               <a:rPr lang="en-US" smtClean="0"/>
-              <a:t>11/14/16</a:t>
+              <a:t>11/15/2016</a:t>
             </a:fld>
             <a:endParaRPr lang="en-US" dirty="0"/>
           </a:p>
@@ -512,7 +517,7 @@
           <a:lstStyle/>
           <a:p>
             <a:r>
-              <a:rPr lang="en-US" smtClean="0"/>
+              <a:rPr lang="en-US"/>
               <a:t>Cliquez et modifiez le titre</a:t>
             </a:r>
             <a:endParaRPr lang="en-US" dirty="0"/>
@@ -541,35 +546,35 @@
           <a:p>
             <a:pPr lvl="0"/>
             <a:r>
-              <a:rPr lang="en-US" smtClean="0"/>
+              <a:rPr lang="en-US"/>
               <a:t>Cliquez pour modifier les styles du texte du masque</a:t>
             </a:r>
           </a:p>
           <a:p>
             <a:pPr lvl="1"/>
             <a:r>
-              <a:rPr lang="en-US" smtClean="0"/>
+              <a:rPr lang="en-US"/>
               <a:t>Deuxième niveau</a:t>
             </a:r>
           </a:p>
           <a:p>
             <a:pPr lvl="2"/>
             <a:r>
-              <a:rPr lang="en-US" smtClean="0"/>
+              <a:rPr lang="en-US"/>
               <a:t>Troisième niveau</a:t>
             </a:r>
           </a:p>
           <a:p>
             <a:pPr lvl="3"/>
             <a:r>
-              <a:rPr lang="en-US" smtClean="0"/>
+              <a:rPr lang="en-US"/>
               <a:t>Quatrième niveau</a:t>
             </a:r>
           </a:p>
           <a:p>
             <a:pPr lvl="4"/>
             <a:r>
-              <a:rPr lang="en-US" smtClean="0"/>
+              <a:rPr lang="en-US"/>
               <a:t>Cinquième niveau</a:t>
             </a:r>
             <a:endParaRPr lang="en-US" dirty="0"/>
@@ -593,7 +598,7 @@
           <a:p>
             <a:fld id="{CF0FD78B-DB02-4362-BCDC-98A55456977C}" type="datetimeFigureOut">
               <a:rPr lang="en-US" smtClean="0"/>
-              <a:t>11/14/16</a:t>
+              <a:t>11/15/2016</a:t>
             </a:fld>
             <a:endParaRPr lang="en-US" dirty="0"/>
           </a:p>
@@ -687,7 +692,7 @@
           <a:lstStyle/>
           <a:p>
             <a:r>
-              <a:rPr lang="en-US" smtClean="0"/>
+              <a:rPr lang="en-US"/>
               <a:t>Cliquez et modifiez le titre</a:t>
             </a:r>
             <a:endParaRPr lang="en-US" dirty="0"/>
@@ -711,35 +716,35 @@
           <a:p>
             <a:pPr lvl="0"/>
             <a:r>
-              <a:rPr lang="en-US" smtClean="0"/>
+              <a:rPr lang="en-US"/>
               <a:t>Cliquez pour modifier les styles du texte du masque</a:t>
             </a:r>
           </a:p>
           <a:p>
             <a:pPr lvl="1"/>
             <a:r>
-              <a:rPr lang="en-US" smtClean="0"/>
+              <a:rPr lang="en-US"/>
               <a:t>Deuxième niveau</a:t>
             </a:r>
           </a:p>
           <a:p>
             <a:pPr lvl="2"/>
             <a:r>
-              <a:rPr lang="en-US" smtClean="0"/>
+              <a:rPr lang="en-US"/>
               <a:t>Troisième niveau</a:t>
             </a:r>
           </a:p>
           <a:p>
             <a:pPr lvl="3"/>
             <a:r>
-              <a:rPr lang="en-US" smtClean="0"/>
+              <a:rPr lang="en-US"/>
               <a:t>Quatrième niveau</a:t>
             </a:r>
           </a:p>
           <a:p>
             <a:pPr lvl="4"/>
             <a:r>
-              <a:rPr lang="en-US" smtClean="0"/>
+              <a:rPr lang="en-US"/>
               <a:t>Cinquième niveau</a:t>
             </a:r>
             <a:endParaRPr lang="en-US" dirty="0"/>
@@ -763,7 +768,7 @@
           <a:p>
             <a:fld id="{99916976-5D93-46E4-A98A-FAD63E4D0EA8}" type="datetimeFigureOut">
               <a:rPr lang="en-US" smtClean="0"/>
-              <a:t>11/14/16</a:t>
+              <a:t>11/15/2016</a:t>
             </a:fld>
             <a:endParaRPr lang="en-US" dirty="0"/>
           </a:p>
@@ -866,7 +871,7 @@
           </a:lstStyle>
           <a:p>
             <a:r>
-              <a:rPr lang="en-US" smtClean="0"/>
+              <a:rPr lang="en-US"/>
               <a:t>Cliquez et modifiez le titre</a:t>
             </a:r>
             <a:endParaRPr lang="en-US" dirty="0"/>
@@ -986,7 +991,7 @@
           <a:p>
             <a:pPr lvl="0"/>
             <a:r>
-              <a:rPr lang="en-US" smtClean="0"/>
+              <a:rPr lang="en-US"/>
               <a:t>Cliquez pour modifier les styles du texte du masque</a:t>
             </a:r>
           </a:p>
@@ -1009,7 +1014,7 @@
           <a:p>
             <a:fld id="{0F39F4F5-F4D2-4D2A-AB60-88D37ADCB869}" type="datetimeFigureOut">
               <a:rPr lang="en-US" smtClean="0"/>
-              <a:t>11/14/16</a:t>
+              <a:t>11/15/2016</a:t>
             </a:fld>
             <a:endParaRPr lang="en-US" dirty="0"/>
           </a:p>
@@ -1103,7 +1108,7 @@
           <a:lstStyle/>
           <a:p>
             <a:r>
-              <a:rPr lang="en-US" smtClean="0"/>
+              <a:rPr lang="en-US"/>
               <a:t>Cliquez et modifiez le titre</a:t>
             </a:r>
             <a:endParaRPr lang="en-US" dirty="0"/>
@@ -1132,35 +1137,35 @@
           <a:p>
             <a:pPr lvl="0"/>
             <a:r>
-              <a:rPr lang="en-US" smtClean="0"/>
+              <a:rPr lang="en-US"/>
               <a:t>Cliquez pour modifier les styles du texte du masque</a:t>
             </a:r>
           </a:p>
           <a:p>
             <a:pPr lvl="1"/>
             <a:r>
-              <a:rPr lang="en-US" smtClean="0"/>
+              <a:rPr lang="en-US"/>
               <a:t>Deuxième niveau</a:t>
             </a:r>
           </a:p>
           <a:p>
             <a:pPr lvl="2"/>
             <a:r>
-              <a:rPr lang="en-US" smtClean="0"/>
+              <a:rPr lang="en-US"/>
               <a:t>Troisième niveau</a:t>
             </a:r>
           </a:p>
           <a:p>
             <a:pPr lvl="3"/>
             <a:r>
-              <a:rPr lang="en-US" smtClean="0"/>
+              <a:rPr lang="en-US"/>
               <a:t>Quatrième niveau</a:t>
             </a:r>
           </a:p>
           <a:p>
             <a:pPr lvl="4"/>
             <a:r>
-              <a:rPr lang="en-US" smtClean="0"/>
+              <a:rPr lang="en-US"/>
               <a:t>Cinquième niveau</a:t>
             </a:r>
             <a:endParaRPr lang="en-US" dirty="0"/>
@@ -1189,35 +1194,35 @@
           <a:p>
             <a:pPr lvl="0"/>
             <a:r>
-              <a:rPr lang="en-US" smtClean="0"/>
+              <a:rPr lang="en-US"/>
               <a:t>Cliquez pour modifier les styles du texte du masque</a:t>
             </a:r>
           </a:p>
           <a:p>
             <a:pPr lvl="1"/>
             <a:r>
-              <a:rPr lang="en-US" smtClean="0"/>
+              <a:rPr lang="en-US"/>
               <a:t>Deuxième niveau</a:t>
             </a:r>
           </a:p>
           <a:p>
             <a:pPr lvl="2"/>
             <a:r>
-              <a:rPr lang="en-US" smtClean="0"/>
+              <a:rPr lang="en-US"/>
               <a:t>Troisième niveau</a:t>
             </a:r>
           </a:p>
           <a:p>
             <a:pPr lvl="3"/>
             <a:r>
-              <a:rPr lang="en-US" smtClean="0"/>
+              <a:rPr lang="en-US"/>
               <a:t>Quatrième niveau</a:t>
             </a:r>
           </a:p>
           <a:p>
             <a:pPr lvl="4"/>
             <a:r>
-              <a:rPr lang="en-US" smtClean="0"/>
+              <a:rPr lang="en-US"/>
               <a:t>Cinquième niveau</a:t>
             </a:r>
             <a:endParaRPr lang="en-US" dirty="0"/>
@@ -1241,7 +1246,7 @@
           <a:p>
             <a:fld id="{D23BC6CE-6D1E-47E5-8859-F31AC5380EB2}" type="datetimeFigureOut">
               <a:rPr lang="en-US" smtClean="0"/>
-              <a:t>11/14/16</a:t>
+              <a:t>11/15/2016</a:t>
             </a:fld>
             <a:endParaRPr lang="en-US" dirty="0"/>
           </a:p>
@@ -1345,7 +1350,7 @@
           <a:lstStyle/>
           <a:p>
             <a:r>
-              <a:rPr lang="en-US" smtClean="0"/>
+              <a:rPr lang="en-US"/>
               <a:t>Cliquez et modifiez le titre</a:t>
             </a:r>
             <a:endParaRPr lang="en-US" dirty="0"/>
@@ -1411,7 +1416,7 @@
           <a:p>
             <a:pPr lvl="0"/>
             <a:r>
-              <a:rPr lang="en-US" smtClean="0"/>
+              <a:rPr lang="en-US"/>
               <a:t>Cliquez pour modifier les styles du texte du masque</a:t>
             </a:r>
           </a:p>
@@ -1439,35 +1444,35 @@
           <a:p>
             <a:pPr lvl="0"/>
             <a:r>
-              <a:rPr lang="en-US" smtClean="0"/>
+              <a:rPr lang="en-US"/>
               <a:t>Cliquez pour modifier les styles du texte du masque</a:t>
             </a:r>
           </a:p>
           <a:p>
             <a:pPr lvl="1"/>
             <a:r>
-              <a:rPr lang="en-US" smtClean="0"/>
+              <a:rPr lang="en-US"/>
               <a:t>Deuxième niveau</a:t>
             </a:r>
           </a:p>
           <a:p>
             <a:pPr lvl="2"/>
             <a:r>
-              <a:rPr lang="en-US" smtClean="0"/>
+              <a:rPr lang="en-US"/>
               <a:t>Troisième niveau</a:t>
             </a:r>
           </a:p>
           <a:p>
             <a:pPr lvl="3"/>
             <a:r>
-              <a:rPr lang="en-US" smtClean="0"/>
+              <a:rPr lang="en-US"/>
               <a:t>Quatrième niveau</a:t>
             </a:r>
           </a:p>
           <a:p>
             <a:pPr lvl="4"/>
             <a:r>
-              <a:rPr lang="en-US" smtClean="0"/>
+              <a:rPr lang="en-US"/>
               <a:t>Cinquième niveau</a:t>
             </a:r>
             <a:endParaRPr lang="en-US" dirty="0"/>
@@ -1533,7 +1538,7 @@
           <a:p>
             <a:pPr lvl="0"/>
             <a:r>
-              <a:rPr lang="en-US" smtClean="0"/>
+              <a:rPr lang="en-US"/>
               <a:t>Cliquez pour modifier les styles du texte du masque</a:t>
             </a:r>
           </a:p>
@@ -1561,35 +1566,35 @@
           <a:p>
             <a:pPr lvl="0"/>
             <a:r>
-              <a:rPr lang="en-US" smtClean="0"/>
+              <a:rPr lang="en-US"/>
               <a:t>Cliquez pour modifier les styles du texte du masque</a:t>
             </a:r>
           </a:p>
           <a:p>
             <a:pPr lvl="1"/>
             <a:r>
-              <a:rPr lang="en-US" smtClean="0"/>
+              <a:rPr lang="en-US"/>
               <a:t>Deuxième niveau</a:t>
             </a:r>
           </a:p>
           <a:p>
             <a:pPr lvl="2"/>
             <a:r>
-              <a:rPr lang="en-US" smtClean="0"/>
+              <a:rPr lang="en-US"/>
               <a:t>Troisième niveau</a:t>
             </a:r>
           </a:p>
           <a:p>
             <a:pPr lvl="3"/>
             <a:r>
-              <a:rPr lang="en-US" smtClean="0"/>
+              <a:rPr lang="en-US"/>
               <a:t>Quatrième niveau</a:t>
             </a:r>
           </a:p>
           <a:p>
             <a:pPr lvl="4"/>
             <a:r>
-              <a:rPr lang="en-US" smtClean="0"/>
+              <a:rPr lang="en-US"/>
               <a:t>Cinquième niveau</a:t>
             </a:r>
             <a:endParaRPr lang="en-US" dirty="0"/>
@@ -1613,7 +1618,7 @@
           <a:p>
             <a:fld id="{B1B4E7C4-4DA4-404D-9965-B13F2DD7D8BF}" type="datetimeFigureOut">
               <a:rPr lang="en-US" smtClean="0"/>
-              <a:t>11/14/16</a:t>
+              <a:t>11/15/2016</a:t>
             </a:fld>
             <a:endParaRPr lang="en-US" dirty="0"/>
           </a:p>
@@ -1712,7 +1717,7 @@
           <a:lstStyle/>
           <a:p>
             <a:r>
-              <a:rPr lang="en-US" smtClean="0"/>
+              <a:rPr lang="en-US"/>
               <a:t>Cliquez et modifiez le titre</a:t>
             </a:r>
             <a:endParaRPr lang="en-US" dirty="0"/>
@@ -1736,7 +1741,7 @@
           <a:p>
             <a:fld id="{476FB7AA-4A53-424F-AD41-70827B6504BA}" type="datetimeFigureOut">
               <a:rPr lang="en-US" smtClean="0"/>
-              <a:t>11/14/16</a:t>
+              <a:t>11/15/2016</a:t>
             </a:fld>
             <a:endParaRPr lang="en-US" dirty="0"/>
           </a:p>
@@ -1831,7 +1836,7 @@
           <a:p>
             <a:fld id="{E7884882-FB12-4BC8-9960-9AD8104D7FAE}" type="datetimeFigureOut">
               <a:rPr lang="en-US" smtClean="0"/>
-              <a:t>11/14/16</a:t>
+              <a:t>11/15/2016</a:t>
             </a:fld>
             <a:endParaRPr lang="en-US" dirty="0"/>
           </a:p>
@@ -1934,7 +1939,7 @@
           </a:lstStyle>
           <a:p>
             <a:r>
-              <a:rPr lang="en-US" smtClean="0"/>
+              <a:rPr lang="en-US"/>
               <a:t>Cliquez et modifiez le titre</a:t>
             </a:r>
             <a:endParaRPr lang="en-US" dirty="0"/>
@@ -1991,35 +1996,35 @@
           <a:p>
             <a:pPr lvl="0"/>
             <a:r>
-              <a:rPr lang="en-US" smtClean="0"/>
+              <a:rPr lang="en-US"/>
               <a:t>Cliquez pour modifier les styles du texte du masque</a:t>
             </a:r>
           </a:p>
           <a:p>
             <a:pPr lvl="1"/>
             <a:r>
-              <a:rPr lang="en-US" smtClean="0"/>
+              <a:rPr lang="en-US"/>
               <a:t>Deuxième niveau</a:t>
             </a:r>
           </a:p>
           <a:p>
             <a:pPr lvl="2"/>
             <a:r>
-              <a:rPr lang="en-US" smtClean="0"/>
+              <a:rPr lang="en-US"/>
               <a:t>Troisième niveau</a:t>
             </a:r>
           </a:p>
           <a:p>
             <a:pPr lvl="3"/>
             <a:r>
-              <a:rPr lang="en-US" smtClean="0"/>
+              <a:rPr lang="en-US"/>
               <a:t>Quatrième niveau</a:t>
             </a:r>
           </a:p>
           <a:p>
             <a:pPr lvl="4"/>
             <a:r>
-              <a:rPr lang="en-US" smtClean="0"/>
+              <a:rPr lang="en-US"/>
               <a:t>Cinquième niveau</a:t>
             </a:r>
             <a:endParaRPr lang="en-US" dirty="0"/>
@@ -2085,7 +2090,7 @@
           <a:p>
             <a:pPr lvl="0"/>
             <a:r>
-              <a:rPr lang="en-US" smtClean="0"/>
+              <a:rPr lang="en-US"/>
               <a:t>Cliquez pour modifier les styles du texte du masque</a:t>
             </a:r>
           </a:p>
@@ -2108,7 +2113,7 @@
           <a:p>
             <a:fld id="{F7D1BD23-6E54-4D9D-AD88-A2813C73CC25}" type="datetimeFigureOut">
               <a:rPr lang="en-US" smtClean="0"/>
-              <a:t>11/14/16</a:t>
+              <a:t>11/15/2016</a:t>
             </a:fld>
             <a:endParaRPr lang="en-US" dirty="0"/>
           </a:p>
@@ -2216,7 +2221,7 @@
           </a:lstStyle>
           <a:p>
             <a:r>
-              <a:rPr lang="en-US" smtClean="0"/>
+              <a:rPr lang="en-US"/>
               <a:t>Cliquez et modifiez le titre</a:t>
             </a:r>
             <a:endParaRPr lang="en-US" dirty="0"/>
@@ -2281,7 +2286,7 @@
           </a:lstStyle>
           <a:p>
             <a:r>
-              <a:rPr lang="en-US" smtClean="0"/>
+              <a:rPr lang="en-US"/>
               <a:t>Faire glisser l'image vers l'espace réservé ou cliquer sur l'icône pour l'ajouter</a:t>
             </a:r>
             <a:endParaRPr lang="en-US" dirty="0"/>
@@ -2347,7 +2352,7 @@
           <a:p>
             <a:pPr lvl="0"/>
             <a:r>
-              <a:rPr lang="en-US" smtClean="0"/>
+              <a:rPr lang="en-US"/>
               <a:t>Cliquez pour modifier les styles du texte du masque</a:t>
             </a:r>
           </a:p>
@@ -2370,7 +2375,7 @@
           <a:p>
             <a:fld id="{1471A834-4F3C-4AF9-9C74-05EC35A0F292}" type="datetimeFigureOut">
               <a:rPr lang="en-US" smtClean="0"/>
-              <a:t>11/14/16</a:t>
+              <a:t>11/15/2016</a:t>
             </a:fld>
             <a:endParaRPr lang="en-US" dirty="0"/>
           </a:p>
@@ -2479,7 +2484,7 @@
           <a:lstStyle/>
           <a:p>
             <a:r>
-              <a:rPr lang="en-US" smtClean="0"/>
+              <a:rPr lang="en-US"/>
               <a:t>Cliquez et modifiez le titre</a:t>
             </a:r>
             <a:endParaRPr lang="en-US" dirty="0"/>
@@ -2513,35 +2518,35 @@
           <a:p>
             <a:pPr lvl="0"/>
             <a:r>
-              <a:rPr lang="en-US" smtClean="0"/>
+              <a:rPr lang="en-US"/>
               <a:t>Cliquez pour modifier les styles du texte du masque</a:t>
             </a:r>
           </a:p>
           <a:p>
             <a:pPr lvl="1"/>
             <a:r>
-              <a:rPr lang="en-US" smtClean="0"/>
+              <a:rPr lang="en-US"/>
               <a:t>Deuxième niveau</a:t>
             </a:r>
           </a:p>
           <a:p>
             <a:pPr lvl="2"/>
             <a:r>
-              <a:rPr lang="en-US" smtClean="0"/>
+              <a:rPr lang="en-US"/>
               <a:t>Troisième niveau</a:t>
             </a:r>
           </a:p>
           <a:p>
             <a:pPr lvl="3"/>
             <a:r>
-              <a:rPr lang="en-US" smtClean="0"/>
+              <a:rPr lang="en-US"/>
               <a:t>Quatrième niveau</a:t>
             </a:r>
           </a:p>
           <a:p>
             <a:pPr lvl="4"/>
             <a:r>
-              <a:rPr lang="en-US" smtClean="0"/>
+              <a:rPr lang="en-US"/>
               <a:t>Cinquième niveau</a:t>
             </a:r>
             <a:endParaRPr lang="en-US" dirty="0"/>
@@ -2583,7 +2588,7 @@
           <a:p>
             <a:fld id="{51CF1133-3259-4C45-BABA-5B62D9C6F78D}" type="datetimeFigureOut">
               <a:rPr lang="en-US" smtClean="0"/>
-              <a:t>11/14/16</a:t>
+              <a:t>11/15/2016</a:t>
             </a:fld>
             <a:endParaRPr lang="en-US" dirty="0"/>
           </a:p>
@@ -3019,14 +3024,11 @@
           <a:p>
             <a:pPr algn="ctr"/>
             <a:r>
-              <a:rPr lang="fr-FR" sz="4000" dirty="0" smtClean="0">
+              <a:rPr lang="fr-FR" sz="4000" dirty="0">
                 <a:latin typeface="+mj-lt"/>
               </a:rPr>
               <a:t>Présentation Intermédiaire</a:t>
             </a:r>
-            <a:endParaRPr lang="fr-FR" sz="4000" dirty="0">
-              <a:latin typeface="+mj-lt"/>
-            </a:endParaRPr>
           </a:p>
         </p:txBody>
       </p:sp>
@@ -3058,39 +3060,35 @@
               <a:t>Henrik </a:t>
             </a:r>
             <a:r>
-              <a:rPr lang="fr-FR" dirty="0" err="1" smtClean="0"/>
+              <a:rPr lang="fr-FR" dirty="0" err="1"/>
               <a:t>Akesson</a:t>
             </a:r>
             <a:r>
-              <a:rPr lang="fr-FR" dirty="0" smtClean="0"/>
-              <a:t>,</a:t>
-            </a:r>
-            <a:r>
               <a:rPr lang="fr-FR" dirty="0"/>
-              <a:t> Patrick </a:t>
-            </a:r>
-            <a:r>
-              <a:rPr lang="fr-FR" dirty="0" err="1" smtClean="0"/>
+              <a:t>, Patrick </a:t>
+            </a:r>
+            <a:r>
+              <a:rPr lang="fr-FR" dirty="0" err="1"/>
               <a:t>Djomo</a:t>
             </a:r>
             <a:r>
-              <a:rPr lang="fr-FR" dirty="0" smtClean="0"/>
+              <a:rPr lang="fr-FR" dirty="0"/>
               <a:t>, Amel </a:t>
             </a:r>
             <a:r>
-              <a:rPr lang="fr-FR" dirty="0" err="1" smtClean="0"/>
+              <a:rPr lang="fr-FR" dirty="0" err="1"/>
               <a:t>Dussier</a:t>
             </a:r>
             <a:r>
-              <a:rPr lang="fr-FR" dirty="0" smtClean="0"/>
+              <a:rPr lang="fr-FR" dirty="0"/>
               <a:t>, Lo</a:t>
             </a:r>
             <a:r>
-              <a:rPr lang="en-US" dirty="0" err="1" smtClean="0"/>
+              <a:rPr lang="en-US" dirty="0" err="1"/>
               <a:t>ïc</a:t>
             </a:r>
             <a:r>
-              <a:rPr lang="en-US" dirty="0" smtClean="0"/>
+              <a:rPr lang="en-US" dirty="0"/>
               <a:t> Serafin</a:t>
             </a:r>
             <a:endParaRPr lang="fr-FR" dirty="0"/>
@@ -3173,10 +3171,9 @@
           <a:lstStyle/>
           <a:p>
             <a:r>
-              <a:rPr lang="fr-FR" dirty="0" smtClean="0"/>
+              <a:rPr lang="fr-FR" dirty="0"/>
               <a:t>Avancement du projet</a:t>
             </a:r>
-            <a:endParaRPr lang="fr-FR" dirty="0"/>
           </a:p>
         </p:txBody>
       </p:sp>
@@ -3342,10 +3339,9 @@
           <a:lstStyle/>
           <a:p>
             <a:r>
-              <a:rPr lang="fr-FR" sz="1200" dirty="0" smtClean="0"/>
+              <a:rPr lang="fr-FR" sz="1200" dirty="0"/>
               <a:t>Aujourd’hui</a:t>
             </a:r>
-            <a:endParaRPr lang="fr-FR" sz="1200" dirty="0"/>
           </a:p>
         </p:txBody>
       </p:sp>
@@ -3425,10 +3421,9 @@
           <a:lstStyle/>
           <a:p>
             <a:r>
-              <a:rPr lang="fr-FR" dirty="0" smtClean="0"/>
+              <a:rPr lang="fr-FR" dirty="0"/>
               <a:t>Technologies utilisées</a:t>
             </a:r>
-            <a:endParaRPr lang="fr-FR" dirty="0"/>
           </a:p>
         </p:txBody>
       </p:sp>
@@ -3554,9 +3549,9 @@
       </p:pic>
       <p:pic>
         <p:nvPicPr>
-          <p:cNvPr id="12" name="Image 11"/>
+          <p:cNvPr id="1026" name="Picture 2" descr="Image result for express js"/>
           <p:cNvPicPr>
-            <a:picLocks noChangeAspect="1"/>
+            <a:picLocks noChangeAspect="1" noChangeArrowheads="1"/>
           </p:cNvPicPr>
           <p:nvPr/>
         </p:nvPicPr>
@@ -3568,18 +3563,111 @@
               </a:ext>
             </a:extLst>
           </a:blip>
+          <a:srcRect/>
           <a:stretch>
             <a:fillRect/>
           </a:stretch>
         </p:blipFill>
-        <p:spPr>
+        <p:spPr bwMode="auto">
           <a:xfrm>
-            <a:off x="7316732" y="5421148"/>
-            <a:ext cx="4123057" cy="631400"/>
+            <a:off x="8772294" y="1356268"/>
+            <a:ext cx="2581506" cy="782779"/>
           </a:xfrm>
           <a:prstGeom prst="rect">
             <a:avLst/>
           </a:prstGeom>
+          <a:noFill/>
+          <a:extLst>
+            <a:ext uri="{909E8E84-426E-40DD-AFC4-6F175D3DCCD1}">
+              <a14:hiddenFill xmlns:a14="http://schemas.microsoft.com/office/drawing/2010/main">
+                <a:solidFill>
+                  <a:srgbClr val="FFFFFF"/>
+                </a:solidFill>
+              </a14:hiddenFill>
+            </a:ext>
+          </a:extLst>
+        </p:spPr>
+      </p:pic>
+      <p:pic>
+        <p:nvPicPr>
+          <p:cNvPr id="1028" name="Picture 4" descr="Image result for mongoose mongodb"/>
+          <p:cNvPicPr>
+            <a:picLocks noChangeAspect="1" noChangeArrowheads="1"/>
+          </p:cNvPicPr>
+          <p:nvPr/>
+        </p:nvPicPr>
+        <p:blipFill>
+          <a:blip r:embed="rId8">
+            <a:extLst>
+              <a:ext uri="{28A0092B-C50C-407E-A947-70E740481C1C}">
+                <a14:useLocalDpi xmlns:a14="http://schemas.microsoft.com/office/drawing/2010/main" val="0"/>
+              </a:ext>
+            </a:extLst>
+          </a:blip>
+          <a:srcRect/>
+          <a:stretch>
+            <a:fillRect/>
+          </a:stretch>
+        </p:blipFill>
+        <p:spPr bwMode="auto">
+          <a:xfrm>
+            <a:off x="7760655" y="4712085"/>
+            <a:ext cx="3524250" cy="1905000"/>
+          </a:xfrm>
+          <a:prstGeom prst="rect">
+            <a:avLst/>
+          </a:prstGeom>
+          <a:noFill/>
+          <a:extLst>
+            <a:ext uri="{909E8E84-426E-40DD-AFC4-6F175D3DCCD1}">
+              <a14:hiddenFill xmlns:a14="http://schemas.microsoft.com/office/drawing/2010/main">
+                <a:solidFill>
+                  <a:srgbClr val="FFFFFF"/>
+                </a:solidFill>
+              </a14:hiddenFill>
+            </a:ext>
+          </a:extLst>
+        </p:spPr>
+      </p:pic>
+      <p:pic>
+        <p:nvPicPr>
+          <p:cNvPr id="1030" name="Picture 6" descr="Image result for html5 css3"/>
+          <p:cNvPicPr>
+            <a:picLocks noChangeAspect="1" noChangeArrowheads="1"/>
+          </p:cNvPicPr>
+          <p:nvPr/>
+        </p:nvPicPr>
+        <p:blipFill>
+          <a:blip r:embed="rId9">
+            <a:extLst>
+              <a:ext uri="{28A0092B-C50C-407E-A947-70E740481C1C}">
+                <a14:useLocalDpi xmlns:a14="http://schemas.microsoft.com/office/drawing/2010/main" val="0"/>
+              </a:ext>
+            </a:extLst>
+          </a:blip>
+          <a:srcRect/>
+          <a:stretch>
+            <a:fillRect/>
+          </a:stretch>
+        </p:blipFill>
+        <p:spPr bwMode="auto">
+          <a:xfrm>
+            <a:off x="4845102" y="5104880"/>
+            <a:ext cx="1942981" cy="1295321"/>
+          </a:xfrm>
+          <a:prstGeom prst="rect">
+            <a:avLst/>
+          </a:prstGeom>
+          <a:noFill/>
+          <a:extLst>
+            <a:ext uri="{909E8E84-426E-40DD-AFC4-6F175D3DCCD1}">
+              <a14:hiddenFill xmlns:a14="http://schemas.microsoft.com/office/drawing/2010/main">
+                <a:solidFill>
+                  <a:srgbClr val="FFFFFF"/>
+                </a:solidFill>
+              </a14:hiddenFill>
+            </a:ext>
+          </a:extLst>
         </p:spPr>
       </p:pic>
     </p:spTree>
@@ -3657,10 +3745,9 @@
           <a:lstStyle/>
           <a:p>
             <a:r>
-              <a:rPr lang="fr-FR" dirty="0" smtClean="0"/>
+              <a:rPr lang="fr-FR" dirty="0"/>
               <a:t>Chiffrement</a:t>
             </a:r>
-            <a:endParaRPr lang="fr-FR" dirty="0"/>
           </a:p>
         </p:txBody>
       </p:sp>
@@ -3710,10 +3797,9 @@
           <a:lstStyle/>
           <a:p>
             <a:r>
-              <a:rPr lang="fr-FR" dirty="0" smtClean="0"/>
+              <a:rPr lang="fr-FR" dirty="0"/>
               <a:t>Démonstration</a:t>
             </a:r>
-            <a:endParaRPr lang="fr-FR" dirty="0"/>
           </a:p>
         </p:txBody>
       </p:sp>

</xml_diff>